<commit_message>
Project proposal edits and submission
</commit_message>
<xml_diff>
--- a/documents/Project Proposal.pptx
+++ b/documents/Project Proposal.pptx
@@ -6,8 +6,8 @@
   </p:sldMasterIdLst>
   <p:sldIdLst>
     <p:sldId id="256" r:id="rId2"/>
-    <p:sldId id="257" r:id="rId3"/>
-    <p:sldId id="259" r:id="rId4"/>
+    <p:sldId id="260" r:id="rId3"/>
+    <p:sldId id="261" r:id="rId4"/>
     <p:sldId id="258" r:id="rId5"/>
   </p:sldIdLst>
   <p:sldSz cx="12192000" cy="6858000"/>
@@ -107,7 +107,109 @@
       </a:defRPr>
     </a:lvl9pPr>
   </p:defaultTextStyle>
+  <p:extLst>
+    <p:ext uri="{EFAFB233-063F-42B5-8137-9DF3F51BA10A}">
+      <p15:sldGuideLst xmlns:p15="http://schemas.microsoft.com/office/powerpoint/2012/main"/>
+    </p:ext>
+  </p:extLst>
 </p:presentation>
+</file>
+
+<file path=ppt/revisionInfo.xml><?xml version="1.0" encoding="utf-8"?>
+<p1510:revInfo xmlns:a="http://schemas.openxmlformats.org/drawingml/2006/main" xmlns:r="http://schemas.openxmlformats.org/officeDocument/2006/relationships" xmlns:p1510="http://schemas.microsoft.com/office/powerpoint/2015/10/main">
+  <p1510:revLst>
+    <p1510:client id="{F0D69949-18AB-4E62-8918-22DD7D75160C}" v="4" dt="2025-11-17T14:29:20.730"/>
+  </p1510:revLst>
+</p1510:revInfo>
+</file>
+
+<file path=ppt/changesInfos/changesInfo1.xml><?xml version="1.0" encoding="utf-8"?>
+<pc:chgInfo xmlns:a="http://schemas.openxmlformats.org/drawingml/2006/main" xmlns:r="http://schemas.openxmlformats.org/officeDocument/2006/relationships" xmlns:ac="http://schemas.microsoft.com/office/drawing/2013/main/command" xmlns:pc="http://schemas.microsoft.com/office/powerpoint/2013/main/command">
+  <pc:docChgLst>
+    <pc:chgData name="Jesse Franks" userId="c6367dd6-8b21-4116-83af-4168098c397d" providerId="ADAL" clId="{6523A8ED-1780-498F-8807-AF95270D881F}"/>
+    <pc:docChg chg="custSel addSld delSld modSld sldOrd">
+      <pc:chgData name="Jesse Franks" userId="c6367dd6-8b21-4116-83af-4168098c397d" providerId="ADAL" clId="{6523A8ED-1780-498F-8807-AF95270D881F}" dt="2025-11-17T14:45:19.312" v="2075" actId="20577"/>
+      <pc:docMkLst>
+        <pc:docMk/>
+      </pc:docMkLst>
+      <pc:sldChg chg="del">
+        <pc:chgData name="Jesse Franks" userId="c6367dd6-8b21-4116-83af-4168098c397d" providerId="ADAL" clId="{6523A8ED-1780-498F-8807-AF95270D881F}" dt="2025-11-17T14:31:02.869" v="428" actId="47"/>
+        <pc:sldMkLst>
+          <pc:docMk/>
+          <pc:sldMk cId="1668319416" sldId="257"/>
+        </pc:sldMkLst>
+      </pc:sldChg>
+      <pc:sldChg chg="modSp mod ord">
+        <pc:chgData name="Jesse Franks" userId="c6367dd6-8b21-4116-83af-4168098c397d" providerId="ADAL" clId="{6523A8ED-1780-498F-8807-AF95270D881F}" dt="2025-11-17T14:45:19.312" v="2075" actId="20577"/>
+        <pc:sldMkLst>
+          <pc:docMk/>
+          <pc:sldMk cId="1783537171" sldId="258"/>
+        </pc:sldMkLst>
+        <pc:spChg chg="mod">
+          <ac:chgData name="Jesse Franks" userId="c6367dd6-8b21-4116-83af-4168098c397d" providerId="ADAL" clId="{6523A8ED-1780-498F-8807-AF95270D881F}" dt="2025-11-17T14:45:19.312" v="2075" actId="20577"/>
+          <ac:spMkLst>
+            <pc:docMk/>
+            <pc:sldMk cId="1783537171" sldId="258"/>
+            <ac:spMk id="3" creationId="{A268339D-076F-D06C-9F12-A5CB4B177452}"/>
+          </ac:spMkLst>
+        </pc:spChg>
+      </pc:sldChg>
+      <pc:sldChg chg="del">
+        <pc:chgData name="Jesse Franks" userId="c6367dd6-8b21-4116-83af-4168098c397d" providerId="ADAL" clId="{6523A8ED-1780-498F-8807-AF95270D881F}" dt="2025-11-17T14:28:43.763" v="166" actId="47"/>
+        <pc:sldMkLst>
+          <pc:docMk/>
+          <pc:sldMk cId="2328425103" sldId="259"/>
+        </pc:sldMkLst>
+      </pc:sldChg>
+      <pc:sldChg chg="modSp new mod">
+        <pc:chgData name="Jesse Franks" userId="c6367dd6-8b21-4116-83af-4168098c397d" providerId="ADAL" clId="{6523A8ED-1780-498F-8807-AF95270D881F}" dt="2025-11-17T14:30:51.434" v="425" actId="20577"/>
+        <pc:sldMkLst>
+          <pc:docMk/>
+          <pc:sldMk cId="1641624386" sldId="260"/>
+        </pc:sldMkLst>
+        <pc:spChg chg="mod">
+          <ac:chgData name="Jesse Franks" userId="c6367dd6-8b21-4116-83af-4168098c397d" providerId="ADAL" clId="{6523A8ED-1780-498F-8807-AF95270D881F}" dt="2025-11-17T14:26:37.676" v="24" actId="1036"/>
+          <ac:spMkLst>
+            <pc:docMk/>
+            <pc:sldMk cId="1641624386" sldId="260"/>
+            <ac:spMk id="2" creationId="{C95A7647-143F-A726-B837-9D46941CEA5C}"/>
+          </ac:spMkLst>
+        </pc:spChg>
+        <pc:spChg chg="mod">
+          <ac:chgData name="Jesse Franks" userId="c6367dd6-8b21-4116-83af-4168098c397d" providerId="ADAL" clId="{6523A8ED-1780-498F-8807-AF95270D881F}" dt="2025-11-17T14:30:51.434" v="425" actId="20577"/>
+          <ac:spMkLst>
+            <pc:docMk/>
+            <pc:sldMk cId="1641624386" sldId="260"/>
+            <ac:spMk id="3" creationId="{4785AC67-9B14-24C4-736D-B395B7115A98}"/>
+          </ac:spMkLst>
+        </pc:spChg>
+      </pc:sldChg>
+      <pc:sldChg chg="modSp new mod">
+        <pc:chgData name="Jesse Franks" userId="c6367dd6-8b21-4116-83af-4168098c397d" providerId="ADAL" clId="{6523A8ED-1780-498F-8807-AF95270D881F}" dt="2025-11-17T14:40:59.375" v="1558" actId="20577"/>
+        <pc:sldMkLst>
+          <pc:docMk/>
+          <pc:sldMk cId="4059255481" sldId="261"/>
+        </pc:sldMkLst>
+        <pc:spChg chg="mod">
+          <ac:chgData name="Jesse Franks" userId="c6367dd6-8b21-4116-83af-4168098c397d" providerId="ADAL" clId="{6523A8ED-1780-498F-8807-AF95270D881F}" dt="2025-11-17T14:27:51.025" v="103" actId="20577"/>
+          <ac:spMkLst>
+            <pc:docMk/>
+            <pc:sldMk cId="4059255481" sldId="261"/>
+            <ac:spMk id="2" creationId="{ECF07E63-21B0-B908-280C-54AF7A4E35B5}"/>
+          </ac:spMkLst>
+        </pc:spChg>
+        <pc:spChg chg="mod">
+          <ac:chgData name="Jesse Franks" userId="c6367dd6-8b21-4116-83af-4168098c397d" providerId="ADAL" clId="{6523A8ED-1780-498F-8807-AF95270D881F}" dt="2025-11-17T14:40:59.375" v="1558" actId="20577"/>
+          <ac:spMkLst>
+            <pc:docMk/>
+            <pc:sldMk cId="4059255481" sldId="261"/>
+            <ac:spMk id="3" creationId="{1C91C5BB-863B-C30D-65BB-96D7CF673F66}"/>
+          </ac:spMkLst>
+        </pc:spChg>
+      </pc:sldChg>
+    </pc:docChg>
+  </pc:docChgLst>
+</pc:chgInfo>
 </file>
 
 <file path=ppt/slideLayouts/slideLayout1.xml><?xml version="1.0" encoding="utf-8"?>
@@ -263,7 +365,7 @@
           <a:p>
             <a:fld id="{D1D1EADE-8E88-4C7C-8AC5-FB148DE4940E}" type="datetime1">
               <a:rPr lang="en-US" smtClean="0"/>
-              <a:t>11/13/2025</a:t>
+              <a:t>11/17/2025</a:t>
             </a:fld>
             <a:endParaRPr lang="en-US"/>
           </a:p>
@@ -463,7 +565,7 @@
           <a:p>
             <a:fld id="{EC3C8B9C-477D-492A-96AD-1FC2CC997A73}" type="datetime1">
               <a:rPr lang="en-US" smtClean="0"/>
-              <a:t>11/13/2025</a:t>
+              <a:t>11/17/2025</a:t>
             </a:fld>
             <a:endParaRPr lang="en-US"/>
           </a:p>
@@ -673,7 +775,7 @@
           <a:p>
             <a:fld id="{42D3AED5-E26D-4E29-B1B3-7847B6779594}" type="datetime1">
               <a:rPr lang="en-US" smtClean="0"/>
-              <a:t>11/13/2025</a:t>
+              <a:t>11/17/2025</a:t>
             </a:fld>
             <a:endParaRPr lang="en-US"/>
           </a:p>
@@ -873,7 +975,7 @@
           <a:p>
             <a:fld id="{157B6794-849E-4626-908B-D15793550EFB}" type="datetime1">
               <a:rPr lang="en-US" smtClean="0"/>
-              <a:t>11/13/2025</a:t>
+              <a:t>11/17/2025</a:t>
             </a:fld>
             <a:endParaRPr lang="en-US"/>
           </a:p>
@@ -1149,7 +1251,7 @@
           <a:p>
             <a:fld id="{63DB64E7-5594-42A3-ADBF-E95A7ACEAD64}" type="datetime1">
               <a:rPr lang="en-US" smtClean="0"/>
-              <a:t>11/13/2025</a:t>
+              <a:t>11/17/2025</a:t>
             </a:fld>
             <a:endParaRPr lang="en-US"/>
           </a:p>
@@ -1422,7 +1524,7 @@
           <a:p>
             <a:fld id="{18462B0B-D248-4FFB-8695-AD7FA4B1284A}" type="datetime1">
               <a:rPr lang="en-US" smtClean="0"/>
-              <a:t>11/13/2025</a:t>
+              <a:t>11/17/2025</a:t>
             </a:fld>
             <a:endParaRPr lang="en-US"/>
           </a:p>
@@ -1845,7 +1947,7 @@
           <a:p>
             <a:fld id="{D0378EFB-9159-4510-B73F-4F0409ADE937}" type="datetime1">
               <a:rPr lang="en-US" smtClean="0"/>
-              <a:t>11/13/2025</a:t>
+              <a:t>11/17/2025</a:t>
             </a:fld>
             <a:endParaRPr lang="en-US"/>
           </a:p>
@@ -1987,7 +2089,7 @@
           <a:p>
             <a:fld id="{89BC9412-2452-4BED-A324-9D8C115361AD}" type="datetime1">
               <a:rPr lang="en-US" smtClean="0"/>
-              <a:t>11/13/2025</a:t>
+              <a:t>11/17/2025</a:t>
             </a:fld>
             <a:endParaRPr lang="en-US"/>
           </a:p>
@@ -2100,7 +2202,7 @@
           <a:p>
             <a:fld id="{F5318F62-D251-40E8-A23C-F4CFE9FEAB41}" type="datetime1">
               <a:rPr lang="en-US" smtClean="0"/>
-              <a:t>11/13/2025</a:t>
+              <a:t>11/17/2025</a:t>
             </a:fld>
             <a:endParaRPr lang="en-US"/>
           </a:p>
@@ -2413,7 +2515,7 @@
           <a:p>
             <a:fld id="{44F76144-149E-4874-93A5-554A0357CF82}" type="datetime1">
               <a:rPr lang="en-US" smtClean="0"/>
-              <a:t>11/13/2025</a:t>
+              <a:t>11/17/2025</a:t>
             </a:fld>
             <a:endParaRPr lang="en-US"/>
           </a:p>
@@ -2706,7 +2808,7 @@
           <a:p>
             <a:fld id="{50BA65D8-0540-4835-AE5C-25D29DBA01BE}" type="datetime1">
               <a:rPr lang="en-US" smtClean="0"/>
-              <a:t>11/13/2025</a:t>
+              <a:t>11/17/2025</a:t>
             </a:fld>
             <a:endParaRPr lang="en-US"/>
           </a:p>
@@ -2948,7 +3050,7 @@
           <a:p>
             <a:fld id="{E31BA835-12AC-4E8F-955A-EA3F4DE2791F}" type="datetime1">
               <a:rPr lang="en-US" smtClean="0"/>
-              <a:t>11/13/2025</a:t>
+              <a:t>11/17/2025</a:t>
             </a:fld>
             <a:endParaRPr lang="en-US"/>
           </a:p>
@@ -3924,7 +4026,7 @@
           <p:cNvPr id="2" name="Title 1">
             <a:extLst>
               <a:ext uri="{FF2B5EF4-FFF2-40B4-BE49-F238E27FC236}">
-                <a16:creationId xmlns:a16="http://schemas.microsoft.com/office/drawing/2014/main" id="{CF46CBE3-44AE-FF95-94D4-0221D9C90664}"/>
+                <a16:creationId xmlns:a16="http://schemas.microsoft.com/office/drawing/2014/main" id="{C95A7647-143F-A726-B837-9D46941CEA5C}"/>
               </a:ext>
             </a:extLst>
           </p:cNvPr>
@@ -3935,45 +4037,71 @@
             <p:ph type="title"/>
           </p:nvPr>
         </p:nvSpPr>
+        <p:spPr>
+          <a:xfrm>
+            <a:off x="700635" y="923109"/>
+            <a:ext cx="10691265" cy="1307592"/>
+          </a:xfrm>
+        </p:spPr>
+        <p:txBody>
+          <a:bodyPr/>
+          <a:lstStyle/>
+          <a:p>
+            <a:r>
+              <a:rPr lang="en-US" dirty="0"/>
+              <a:t>Intro</a:t>
+            </a:r>
+          </a:p>
+        </p:txBody>
+      </p:sp>
+      <p:sp>
+        <p:nvSpPr>
+          <p:cNvPr id="3" name="Content Placeholder 2">
+            <a:extLst>
+              <a:ext uri="{FF2B5EF4-FFF2-40B4-BE49-F238E27FC236}">
+                <a16:creationId xmlns:a16="http://schemas.microsoft.com/office/drawing/2014/main" id="{4785AC67-9B14-24C4-736D-B395B7115A98}"/>
+              </a:ext>
+            </a:extLst>
+          </p:cNvPr>
+          <p:cNvSpPr>
+            <a:spLocks noGrp="1"/>
+          </p:cNvSpPr>
+          <p:nvPr>
+            <p:ph idx="1"/>
+          </p:nvPr>
+        </p:nvSpPr>
         <p:spPr/>
         <p:txBody>
           <a:bodyPr/>
           <a:lstStyle/>
           <a:p>
+            <a:pPr marL="0" indent="0">
+              <a:buNone/>
+            </a:pPr>
             <a:r>
               <a:rPr lang="en-US" dirty="0"/>
-              <a:t>Problem</a:t>
-            </a:r>
-          </a:p>
-        </p:txBody>
-      </p:sp>
-      <p:sp>
-        <p:nvSpPr>
-          <p:cNvPr id="3" name="Content Placeholder 2">
-            <a:extLst>
-              <a:ext uri="{FF2B5EF4-FFF2-40B4-BE49-F238E27FC236}">
-                <a16:creationId xmlns:a16="http://schemas.microsoft.com/office/drawing/2014/main" id="{1ADEC5EA-353A-87A8-C5E6-C4CADCFCC7DC}"/>
-              </a:ext>
-            </a:extLst>
-          </p:cNvPr>
-          <p:cNvSpPr>
-            <a:spLocks noGrp="1"/>
-          </p:cNvSpPr>
-          <p:nvPr>
-            <p:ph idx="1"/>
-          </p:nvPr>
-        </p:nvSpPr>
-        <p:spPr/>
-        <p:txBody>
-          <a:bodyPr/>
-          <a:lstStyle/>
+              <a:t>Overview of Problem and why it matters: </a:t>
+            </a:r>
+          </a:p>
+          <a:p>
+            <a:r>
+              <a:rPr lang="en-US" dirty="0"/>
+              <a:t>Software testing is tricky, and it’s hard to cover every combination of inputs a user can give. While creating and testing robust software helps to mitigate risk, you can never achieve 0 risk. Software with security vulnerabilities can leads to a wide range of problems, including loss of personal data, negative PR, and lost revenue.</a:t>
+            </a:r>
+          </a:p>
           <a:p>
             <a:pPr marL="0" indent="0">
               <a:buNone/>
             </a:pPr>
             <a:r>
               <a:rPr lang="en-US" dirty="0"/>
-              <a:t>Software testing is tricky, and it’s hard to cover every combination of inputs a user can give. While creating and testing robust software helps to mitigate risk, you can never achieve 0 risk. This is where State Space Sleuth comes into play. It aims to help explore states in a user’s software to uncover hidden vulnerabilities, adding another layer of security to a testing pipeline. </a:t>
+              <a:t>Objective: </a:t>
+            </a:r>
+          </a:p>
+          <a:p>
+            <a:r>
+              <a:rPr lang="en-US" dirty="0"/>
+              <a:t>Create an agent that can expose SQL injection vulnerabilities in an application</a:t>
             </a:r>
           </a:p>
         </p:txBody>
@@ -3981,7 +4109,7 @@
     </p:spTree>
     <p:extLst>
       <p:ext uri="{BB962C8B-B14F-4D97-AF65-F5344CB8AC3E}">
-        <p14:creationId xmlns:p14="http://schemas.microsoft.com/office/powerpoint/2010/main" val="1668319416"/>
+        <p14:creationId xmlns:p14="http://schemas.microsoft.com/office/powerpoint/2010/main" val="1641624386"/>
       </p:ext>
     </p:extLst>
   </p:cSld>
@@ -4013,7 +4141,7 @@
           <p:cNvPr id="2" name="Title 1">
             <a:extLst>
               <a:ext uri="{FF2B5EF4-FFF2-40B4-BE49-F238E27FC236}">
-                <a16:creationId xmlns:a16="http://schemas.microsoft.com/office/drawing/2014/main" id="{A4995EA9-3B1D-29A9-2880-9B411609B09F}"/>
+                <a16:creationId xmlns:a16="http://schemas.microsoft.com/office/drawing/2014/main" id="{ECF07E63-21B0-B908-280C-54AF7A4E35B5}"/>
               </a:ext>
             </a:extLst>
           </p:cNvPr>
@@ -4031,7 +4159,7 @@
           <a:p>
             <a:r>
               <a:rPr lang="en-US" dirty="0"/>
-              <a:t>Goal</a:t>
+              <a:t>Proposed Solution</a:t>
             </a:r>
           </a:p>
         </p:txBody>
@@ -4041,7 +4169,7 @@
           <p:cNvPr id="3" name="Content Placeholder 2">
             <a:extLst>
               <a:ext uri="{FF2B5EF4-FFF2-40B4-BE49-F238E27FC236}">
-                <a16:creationId xmlns:a16="http://schemas.microsoft.com/office/drawing/2014/main" id="{4A2B4A16-A5E5-A940-9CB9-72FC22367A51}"/>
+                <a16:creationId xmlns:a16="http://schemas.microsoft.com/office/drawing/2014/main" id="{1C91C5BB-863B-C30D-65BB-96D7CF673F66}"/>
               </a:ext>
             </a:extLst>
           </p:cNvPr>
@@ -4054,7 +4182,9 @@
         </p:nvSpPr>
         <p:spPr/>
         <p:txBody>
-          <a:bodyPr/>
+          <a:bodyPr>
+            <a:normAutofit lnSpcReduction="10000"/>
+          </a:bodyPr>
           <a:lstStyle/>
           <a:p>
             <a:pPr marL="0" indent="0">
@@ -4062,15 +4192,44 @@
             </a:pPr>
             <a:r>
               <a:rPr lang="en-US" dirty="0"/>
-              <a:t>The goal is to create an agent that can explore the state space of an application and intelligently work to find erroneous states in an application. The approach will use A*, and a comparison to BFS, to do this. </a:t>
-            </a:r>
+              <a:t>Our agent can explore the state space of an application and intelligently work to find erroneous states in it. The approach will use A*, and a comparison to BFS, to do this. The state space will be represented by the response of our login page, where the algorithm aims to login as an Admin without providing a password. SQLite will be used to host the DB. A lightweight Flask app will be used as the “victim”, and </a:t>
+            </a:r>
+            <a:r>
+              <a:rPr lang="en-US" dirty="0" err="1"/>
+              <a:t>BeautifulSoup</a:t>
+            </a:r>
+            <a:r>
+              <a:rPr lang="en-US" dirty="0"/>
+              <a:t> will be used to help parse HTML responses.</a:t>
+            </a:r>
+          </a:p>
+          <a:p>
+            <a:pPr marL="0" indent="0">
+              <a:buNone/>
+            </a:pPr>
+            <a:endParaRPr lang="en-US" dirty="0"/>
+          </a:p>
+          <a:p>
+            <a:pPr marL="0" indent="0">
+              <a:buNone/>
+            </a:pPr>
+            <a:r>
+              <a:rPr lang="en-US" dirty="0"/>
+              <a:t>Deliverable: An intelligent agent that iterates on predefined username and password variations to attempt to login to our application as an Admin without providing a password. The path the agent takes will be tracked along with other metrics that seem fitting as the project is developed. These metrics will be used to document the process and as a comparison between the DFS and BFS approach.</a:t>
+            </a:r>
+          </a:p>
+          <a:p>
+            <a:pPr marL="0" indent="0">
+              <a:buNone/>
+            </a:pPr>
+            <a:endParaRPr lang="en-US" dirty="0"/>
           </a:p>
         </p:txBody>
       </p:sp>
     </p:spTree>
     <p:extLst>
       <p:ext uri="{BB962C8B-B14F-4D97-AF65-F5344CB8AC3E}">
-        <p14:creationId xmlns:p14="http://schemas.microsoft.com/office/powerpoint/2010/main" val="2328425103"/>
+        <p14:creationId xmlns:p14="http://schemas.microsoft.com/office/powerpoint/2010/main" val="4059255481"/>
       </p:ext>
     </p:extLst>
   </p:cSld>
@@ -4143,7 +4302,9 @@
         </p:nvSpPr>
         <p:spPr/>
         <p:txBody>
-          <a:bodyPr/>
+          <a:bodyPr>
+            <a:normAutofit fontScale="92500"/>
+          </a:bodyPr>
           <a:lstStyle/>
           <a:p>
             <a:pPr marL="0" indent="0">
@@ -4151,38 +4312,82 @@
             </a:pPr>
             <a:r>
               <a:rPr lang="en-US" dirty="0"/>
-              <a:t>To demonstrate the capabilities of this tool, we must create a few things:</a:t>
-            </a:r>
-          </a:p>
-          <a:p>
+              <a:t>Roadmap:</a:t>
+            </a:r>
+          </a:p>
+          <a:p>
+            <a:pPr marL="457200" indent="-457200">
+              <a:buFont typeface="+mj-lt"/>
+              <a:buAutoNum type="arabicPeriod"/>
+            </a:pPr>
             <a:r>
               <a:rPr lang="en-US" dirty="0"/>
-              <a:t>The algorithm – using A*, an informed search algorithm, we can use a username and password to search for a combination that allows us to successfully login as an Admin using a SQL injection.</a:t>
-            </a:r>
-          </a:p>
-          <a:p>
+              <a:t>Create a lightweight app with a /login endpoint, where there are username and password fields</a:t>
+            </a:r>
+          </a:p>
+          <a:p>
+            <a:pPr marL="457200" indent="-457200">
+              <a:buFont typeface="+mj-lt"/>
+              <a:buAutoNum type="arabicPeriod"/>
+            </a:pPr>
             <a:r>
               <a:rPr lang="en-US" dirty="0"/>
-              <a:t>The heuristic – A* makes use of a heuristic to be informed, so we will build a custom heuristic to determine how close the result of a given try is to the goal state</a:t>
-            </a:r>
-          </a:p>
-          <a:p>
+              <a:t>Create the DB to store our users in</a:t>
+            </a:r>
+          </a:p>
+          <a:p>
+            <a:pPr marL="457200" indent="-457200">
+              <a:buFont typeface="+mj-lt"/>
+              <a:buAutoNum type="arabicPeriod"/>
+            </a:pPr>
             <a:r>
               <a:rPr lang="en-US" dirty="0"/>
-              <a:t>A lightweight Flask server to act as the vulnerable app</a:t>
-            </a:r>
-          </a:p>
-          <a:p>
-            <a:r>
-              <a:rPr lang="en-US" dirty="0" err="1"/>
-              <a:t>BeautifulSoup</a:t>
-            </a:r>
+              <a:t>Implement a State class to hold information on a state, such as the cost(s), username, password, and parent State. We will also implement a __le__ method to help compare states in the heap</a:t>
+            </a:r>
+          </a:p>
+          <a:p>
+            <a:pPr marL="457200" indent="-457200">
+              <a:buFont typeface="+mj-lt"/>
+              <a:buAutoNum type="arabicPeriod"/>
+            </a:pPr>
             <a:r>
               <a:rPr lang="en-US" dirty="0"/>
-              <a:t> logic to parse HTML responses</a:t>
-            </a:r>
-          </a:p>
-          <a:p>
+              <a:t>Implement helpers to calculate costs and generate mutations</a:t>
+            </a:r>
+          </a:p>
+          <a:p>
+            <a:pPr marL="457200" indent="-457200">
+              <a:buFont typeface="+mj-lt"/>
+              <a:buAutoNum type="arabicPeriod"/>
+            </a:pPr>
+            <a:r>
+              <a:rPr lang="en-US" dirty="0"/>
+              <a:t>Implement the A* and BFS algorithms</a:t>
+            </a:r>
+          </a:p>
+          <a:p>
+            <a:pPr marL="457200" indent="-457200">
+              <a:buFont typeface="+mj-lt"/>
+              <a:buAutoNum type="arabicPeriod"/>
+            </a:pPr>
+            <a:r>
+              <a:rPr lang="en-US" dirty="0"/>
+              <a:t>Write a script </a:t>
+            </a:r>
+            <a:r>
+              <a:rPr lang="en-US"/>
+              <a:t>to log </a:t>
+            </a:r>
+            <a:r>
+              <a:rPr lang="en-US" dirty="0"/>
+              <a:t>information throughout the process.</a:t>
+            </a:r>
+          </a:p>
+          <a:p>
+            <a:pPr marL="457200" indent="-457200">
+              <a:buFont typeface="+mj-lt"/>
+              <a:buAutoNum type="arabicPeriod"/>
+            </a:pPr>
             <a:endParaRPr lang="en-US" dirty="0"/>
           </a:p>
         </p:txBody>

</xml_diff>